<commit_message>
fin séquence python, v1
</commit_message>
<xml_diff>
--- a/01_python/cours/02_présentation de python.pptx
+++ b/01_python/cours/02_présentation de python.pptx
@@ -1628,14 +1628,14 @@
           <a:effectLst/>
           <a:extLst>
             <a:ext uri="{909E8E84-426E-40dd-AFC4-6F175D3DCCD1}">
-              <a14:hiddenFill xmlns:a14="http://schemas.microsoft.com/office/drawing/2010/main" xmlns="">
+              <a14:hiddenFill xmlns="" xmlns:a14="http://schemas.microsoft.com/office/drawing/2010/main">
                 <a:solidFill>
                   <a:schemeClr val="accent1"/>
                 </a:solidFill>
               </a14:hiddenFill>
             </a:ext>
             <a:ext uri="{91240B29-F687-4f45-9708-019B960494DF}">
-              <a14:hiddenLine xmlns:a14="http://schemas.microsoft.com/office/drawing/2010/main" xmlns="" w="9525">
+              <a14:hiddenLine xmlns="" xmlns:a14="http://schemas.microsoft.com/office/drawing/2010/main" w="9525">
                 <a:solidFill>
                   <a:schemeClr val="tx1"/>
                 </a:solidFill>
@@ -1645,7 +1645,7 @@
               </a14:hiddenLine>
             </a:ext>
             <a:ext uri="{AF507438-7753-43e0-B8FC-AC1667EBCBE1}">
-              <a14:hiddenEffects xmlns:a14="http://schemas.microsoft.com/office/drawing/2010/main" xmlns="">
+              <a14:hiddenEffects xmlns="" xmlns:a14="http://schemas.microsoft.com/office/drawing/2010/main">
                 <a:effectLst>
                   <a:outerShdw blurRad="63500" dist="38099" dir="2700000" algn="ctr" rotWithShape="0">
                     <a:schemeClr val="bg2">
@@ -1656,7 +1656,7 @@
               </a14:hiddenEffects>
             </a:ext>
             <a:ext uri="{FAA26D3D-D897-4be2-8F04-BA451C77F1D7}">
-              <ma14:placeholderFlag xmlns:ma14="http://schemas.microsoft.com/office/mac/drawingml/2011/main" xmlns="" val="1"/>
+              <ma14:placeholderFlag xmlns="" xmlns:ma14="http://schemas.microsoft.com/office/mac/drawingml/2011/main" val="1"/>
             </a:ext>
           </a:extLst>
         </p:spPr>
@@ -1701,14 +1701,14 @@
           <a:effectLst/>
           <a:extLst>
             <a:ext uri="{909E8E84-426E-40dd-AFC4-6F175D3DCCD1}">
-              <a14:hiddenFill xmlns:a14="http://schemas.microsoft.com/office/drawing/2010/main" xmlns="">
+              <a14:hiddenFill xmlns="" xmlns:a14="http://schemas.microsoft.com/office/drawing/2010/main">
                 <a:solidFill>
                   <a:schemeClr val="accent1"/>
                 </a:solidFill>
               </a14:hiddenFill>
             </a:ext>
             <a:ext uri="{91240B29-F687-4f45-9708-019B960494DF}">
-              <a14:hiddenLine xmlns:a14="http://schemas.microsoft.com/office/drawing/2010/main" xmlns="" w="9525">
+              <a14:hiddenLine xmlns="" xmlns:a14="http://schemas.microsoft.com/office/drawing/2010/main" w="9525">
                 <a:solidFill>
                   <a:schemeClr val="tx1"/>
                 </a:solidFill>
@@ -1718,7 +1718,7 @@
               </a14:hiddenLine>
             </a:ext>
             <a:ext uri="{AF507438-7753-43e0-B8FC-AC1667EBCBE1}">
-              <a14:hiddenEffects xmlns:a14="http://schemas.microsoft.com/office/drawing/2010/main" xmlns="">
+              <a14:hiddenEffects xmlns="" xmlns:a14="http://schemas.microsoft.com/office/drawing/2010/main">
                 <a:effectLst>
                   <a:outerShdw blurRad="63500" dist="38099" dir="2700000" algn="ctr" rotWithShape="0">
                     <a:schemeClr val="bg2">
@@ -1729,7 +1729,7 @@
               </a14:hiddenEffects>
             </a:ext>
             <a:ext uri="{FAA26D3D-D897-4be2-8F04-BA451C77F1D7}">
-              <ma14:placeholderFlag xmlns:ma14="http://schemas.microsoft.com/office/mac/drawingml/2011/main" xmlns="" val="1"/>
+              <ma14:placeholderFlag xmlns="" xmlns:ma14="http://schemas.microsoft.com/office/mac/drawingml/2011/main" val="1"/>
             </a:ext>
           </a:extLst>
         </p:spPr>
@@ -1774,14 +1774,14 @@
           <a:effectLst/>
           <a:extLst>
             <a:ext uri="{909E8E84-426E-40dd-AFC4-6F175D3DCCD1}">
-              <a14:hiddenFill xmlns:a14="http://schemas.microsoft.com/office/drawing/2010/main" xmlns="">
+              <a14:hiddenFill xmlns="" xmlns:a14="http://schemas.microsoft.com/office/drawing/2010/main">
                 <a:solidFill>
                   <a:schemeClr val="accent1"/>
                 </a:solidFill>
               </a14:hiddenFill>
             </a:ext>
             <a:ext uri="{91240B29-F687-4f45-9708-019B960494DF}">
-              <a14:hiddenLine xmlns:a14="http://schemas.microsoft.com/office/drawing/2010/main" xmlns="" w="9525">
+              <a14:hiddenLine xmlns="" xmlns:a14="http://schemas.microsoft.com/office/drawing/2010/main" w="9525">
                 <a:solidFill>
                   <a:schemeClr val="tx1"/>
                 </a:solidFill>
@@ -1791,7 +1791,7 @@
               </a14:hiddenLine>
             </a:ext>
             <a:ext uri="{AF507438-7753-43e0-B8FC-AC1667EBCBE1}">
-              <a14:hiddenEffects xmlns:a14="http://schemas.microsoft.com/office/drawing/2010/main" xmlns="">
+              <a14:hiddenEffects xmlns="" xmlns:a14="http://schemas.microsoft.com/office/drawing/2010/main">
                 <a:effectLst>
                   <a:outerShdw blurRad="63500" dist="38099" dir="2700000" algn="ctr" rotWithShape="0">
                     <a:schemeClr val="bg2">
@@ -1802,7 +1802,7 @@
               </a14:hiddenEffects>
             </a:ext>
             <a:ext uri="{FAA26D3D-D897-4be2-8F04-BA451C77F1D7}">
-              <ma14:placeholderFlag xmlns:ma14="http://schemas.microsoft.com/office/mac/drawingml/2011/main" xmlns="" val="1"/>
+              <ma14:placeholderFlag xmlns="" xmlns:ma14="http://schemas.microsoft.com/office/mac/drawingml/2011/main" val="1"/>
             </a:ext>
           </a:extLst>
         </p:spPr>
@@ -1847,14 +1847,14 @@
           <a:effectLst/>
           <a:extLst>
             <a:ext uri="{909E8E84-426E-40dd-AFC4-6F175D3DCCD1}">
-              <a14:hiddenFill xmlns:a14="http://schemas.microsoft.com/office/drawing/2010/main" xmlns="">
+              <a14:hiddenFill xmlns="" xmlns:a14="http://schemas.microsoft.com/office/drawing/2010/main">
                 <a:solidFill>
                   <a:schemeClr val="accent1"/>
                 </a:solidFill>
               </a14:hiddenFill>
             </a:ext>
             <a:ext uri="{91240B29-F687-4f45-9708-019B960494DF}">
-              <a14:hiddenLine xmlns:a14="http://schemas.microsoft.com/office/drawing/2010/main" xmlns="" w="9525">
+              <a14:hiddenLine xmlns="" xmlns:a14="http://schemas.microsoft.com/office/drawing/2010/main" w="9525">
                 <a:solidFill>
                   <a:schemeClr val="tx1"/>
                 </a:solidFill>
@@ -1864,7 +1864,7 @@
               </a14:hiddenLine>
             </a:ext>
             <a:ext uri="{AF507438-7753-43e0-B8FC-AC1667EBCBE1}">
-              <a14:hiddenEffects xmlns:a14="http://schemas.microsoft.com/office/drawing/2010/main" xmlns="">
+              <a14:hiddenEffects xmlns="" xmlns:a14="http://schemas.microsoft.com/office/drawing/2010/main">
                 <a:effectLst>
                   <a:outerShdw blurRad="63500" dist="38099" dir="2700000" algn="ctr" rotWithShape="0">
                     <a:schemeClr val="bg2">
@@ -1875,7 +1875,7 @@
               </a14:hiddenEffects>
             </a:ext>
             <a:ext uri="{FAA26D3D-D897-4be2-8F04-BA451C77F1D7}">
-              <ma14:placeholderFlag xmlns:ma14="http://schemas.microsoft.com/office/mac/drawingml/2011/main" xmlns="" val="1"/>
+              <ma14:placeholderFlag xmlns="" xmlns:ma14="http://schemas.microsoft.com/office/mac/drawingml/2011/main" val="1"/>
             </a:ext>
           </a:extLst>
         </p:spPr>
@@ -1961,14 +1961,14 @@
           <a:effectLst/>
           <a:extLst>
             <a:ext uri="{909E8E84-426E-40dd-AFC4-6F175D3DCCD1}">
-              <a14:hiddenFill xmlns:a14="http://schemas.microsoft.com/office/drawing/2010/main" xmlns="">
+              <a14:hiddenFill xmlns="" xmlns:a14="http://schemas.microsoft.com/office/drawing/2010/main">
                 <a:solidFill>
                   <a:schemeClr val="accent1"/>
                 </a:solidFill>
               </a14:hiddenFill>
             </a:ext>
             <a:ext uri="{91240B29-F687-4f45-9708-019B960494DF}">
-              <a14:hiddenLine xmlns:a14="http://schemas.microsoft.com/office/drawing/2010/main" xmlns="" w="9525">
+              <a14:hiddenLine xmlns="" xmlns:a14="http://schemas.microsoft.com/office/drawing/2010/main" w="9525">
                 <a:solidFill>
                   <a:schemeClr val="tx1"/>
                 </a:solidFill>
@@ -1978,7 +1978,7 @@
               </a14:hiddenLine>
             </a:ext>
             <a:ext uri="{AF507438-7753-43e0-B8FC-AC1667EBCBE1}">
-              <a14:hiddenEffects xmlns:a14="http://schemas.microsoft.com/office/drawing/2010/main" xmlns="">
+              <a14:hiddenEffects xmlns="" xmlns:a14="http://schemas.microsoft.com/office/drawing/2010/main">
                 <a:effectLst>
                   <a:outerShdw blurRad="63500" dist="38099" dir="2700000" algn="ctr" rotWithShape="0">
                     <a:schemeClr val="bg2">
@@ -1989,7 +1989,7 @@
               </a14:hiddenEffects>
             </a:ext>
             <a:ext uri="{FAA26D3D-D897-4be2-8F04-BA451C77F1D7}">
-              <ma14:placeholderFlag xmlns:ma14="http://schemas.microsoft.com/office/mac/drawingml/2011/main" xmlns="" val="1"/>
+              <ma14:placeholderFlag xmlns="" xmlns:ma14="http://schemas.microsoft.com/office/mac/drawingml/2011/main" val="1"/>
             </a:ext>
           </a:extLst>
         </p:spPr>
@@ -2034,14 +2034,14 @@
           <a:effectLst/>
           <a:extLst>
             <a:ext uri="{909E8E84-426E-40dd-AFC4-6F175D3DCCD1}">
-              <a14:hiddenFill xmlns:a14="http://schemas.microsoft.com/office/drawing/2010/main" xmlns="">
+              <a14:hiddenFill xmlns="" xmlns:a14="http://schemas.microsoft.com/office/drawing/2010/main">
                 <a:solidFill>
                   <a:schemeClr val="accent1"/>
                 </a:solidFill>
               </a14:hiddenFill>
             </a:ext>
             <a:ext uri="{91240B29-F687-4f45-9708-019B960494DF}">
-              <a14:hiddenLine xmlns:a14="http://schemas.microsoft.com/office/drawing/2010/main" xmlns="" w="9525">
+              <a14:hiddenLine xmlns="" xmlns:a14="http://schemas.microsoft.com/office/drawing/2010/main" w="9525">
                 <a:solidFill>
                   <a:schemeClr val="tx1"/>
                 </a:solidFill>
@@ -2051,7 +2051,7 @@
               </a14:hiddenLine>
             </a:ext>
             <a:ext uri="{AF507438-7753-43e0-B8FC-AC1667EBCBE1}">
-              <a14:hiddenEffects xmlns:a14="http://schemas.microsoft.com/office/drawing/2010/main" xmlns="">
+              <a14:hiddenEffects xmlns="" xmlns:a14="http://schemas.microsoft.com/office/drawing/2010/main">
                 <a:effectLst>
                   <a:outerShdw blurRad="63500" dist="38099" dir="2700000" algn="ctr" rotWithShape="0">
                     <a:schemeClr val="bg2">
@@ -2062,7 +2062,7 @@
               </a14:hiddenEffects>
             </a:ext>
             <a:ext uri="{FAA26D3D-D897-4be2-8F04-BA451C77F1D7}">
-              <ma14:placeholderFlag xmlns:ma14="http://schemas.microsoft.com/office/mac/drawingml/2011/main" xmlns="" val="1"/>
+              <ma14:placeholderFlag xmlns="" xmlns:ma14="http://schemas.microsoft.com/office/mac/drawingml/2011/main" val="1"/>
             </a:ext>
           </a:extLst>
         </p:spPr>
@@ -2112,7 +2112,7 @@
           <a:effectLst/>
           <a:extLst>
             <a:ext uri="{AF507438-7753-43e0-B8FC-AC1667EBCBE1}">
-              <a14:hiddenEffects xmlns:a14="http://schemas.microsoft.com/office/drawing/2010/main" xmlns="">
+              <a14:hiddenEffects xmlns="" xmlns:a14="http://schemas.microsoft.com/office/drawing/2010/main">
                 <a:effectLst>
                   <a:outerShdw blurRad="63500" dist="38099" dir="2700000" algn="ctr" rotWithShape="0">
                     <a:srgbClr val="000000">
@@ -2123,7 +2123,7 @@
               </a14:hiddenEffects>
             </a:ext>
             <a:ext uri="{53640926-AAD7-44d8-BBD7-CCE9431645EC}">
-              <a14:shadowObscured xmlns:a14="http://schemas.microsoft.com/office/drawing/2010/main" xmlns="" val="1"/>
+              <a14:shadowObscured xmlns="" xmlns:a14="http://schemas.microsoft.com/office/drawing/2010/main" val="1"/>
             </a:ext>
           </a:extLst>
         </p:spPr>
@@ -2153,14 +2153,14 @@
           <a:effectLst/>
           <a:extLst>
             <a:ext uri="{909E8E84-426E-40dd-AFC4-6F175D3DCCD1}">
-              <a14:hiddenFill xmlns:a14="http://schemas.microsoft.com/office/drawing/2010/main" xmlns="">
+              <a14:hiddenFill xmlns="" xmlns:a14="http://schemas.microsoft.com/office/drawing/2010/main">
                 <a:solidFill>
                   <a:schemeClr val="accent1"/>
                 </a:solidFill>
               </a14:hiddenFill>
             </a:ext>
             <a:ext uri="{91240B29-F687-4f45-9708-019B960494DF}">
-              <a14:hiddenLine xmlns:a14="http://schemas.microsoft.com/office/drawing/2010/main" xmlns="" w="9525">
+              <a14:hiddenLine xmlns="" xmlns:a14="http://schemas.microsoft.com/office/drawing/2010/main" w="9525">
                 <a:solidFill>
                   <a:schemeClr val="tx1"/>
                 </a:solidFill>
@@ -2170,7 +2170,7 @@
               </a14:hiddenLine>
             </a:ext>
             <a:ext uri="{AF507438-7753-43e0-B8FC-AC1667EBCBE1}">
-              <a14:hiddenEffects xmlns:a14="http://schemas.microsoft.com/office/drawing/2010/main" xmlns="">
+              <a14:hiddenEffects xmlns="" xmlns:a14="http://schemas.microsoft.com/office/drawing/2010/main">
                 <a:effectLst>
                   <a:outerShdw blurRad="63500" dist="38099" dir="2700000" algn="ctr" rotWithShape="0">
                     <a:schemeClr val="bg2">
@@ -2181,7 +2181,7 @@
               </a14:hiddenEffects>
             </a:ext>
             <a:ext uri="{FAA26D3D-D897-4be2-8F04-BA451C77F1D7}">
-              <ma14:placeholderFlag xmlns:ma14="http://schemas.microsoft.com/office/mac/drawingml/2011/main" xmlns="" val="1"/>
+              <ma14:placeholderFlag xmlns="" xmlns:ma14="http://schemas.microsoft.com/office/mac/drawingml/2011/main" val="1"/>
             </a:ext>
           </a:extLst>
         </p:spPr>
@@ -2254,14 +2254,14 @@
           <a:effectLst/>
           <a:extLst>
             <a:ext uri="{909E8E84-426E-40dd-AFC4-6F175D3DCCD1}">
-              <a14:hiddenFill xmlns:a14="http://schemas.microsoft.com/office/drawing/2010/main" xmlns="">
+              <a14:hiddenFill xmlns="" xmlns:a14="http://schemas.microsoft.com/office/drawing/2010/main">
                 <a:solidFill>
                   <a:schemeClr val="accent1"/>
                 </a:solidFill>
               </a14:hiddenFill>
             </a:ext>
             <a:ext uri="{91240B29-F687-4f45-9708-019B960494DF}">
-              <a14:hiddenLine xmlns:a14="http://schemas.microsoft.com/office/drawing/2010/main" xmlns="" w="9525">
+              <a14:hiddenLine xmlns="" xmlns:a14="http://schemas.microsoft.com/office/drawing/2010/main" w="9525">
                 <a:solidFill>
                   <a:schemeClr val="tx1"/>
                 </a:solidFill>
@@ -2271,7 +2271,7 @@
               </a14:hiddenLine>
             </a:ext>
             <a:ext uri="{AF507438-7753-43e0-B8FC-AC1667EBCBE1}">
-              <a14:hiddenEffects xmlns:a14="http://schemas.microsoft.com/office/drawing/2010/main" xmlns="">
+              <a14:hiddenEffects xmlns="" xmlns:a14="http://schemas.microsoft.com/office/drawing/2010/main">
                 <a:effectLst>
                   <a:outerShdw blurRad="63500" dist="38099" dir="2700000" algn="ctr" rotWithShape="0">
                     <a:schemeClr val="bg2">
@@ -2282,7 +2282,7 @@
               </a14:hiddenEffects>
             </a:ext>
             <a:ext uri="{FAA26D3D-D897-4be2-8F04-BA451C77F1D7}">
-              <ma14:placeholderFlag xmlns:ma14="http://schemas.microsoft.com/office/mac/drawingml/2011/main" xmlns="" val="1"/>
+              <ma14:placeholderFlag xmlns="" xmlns:ma14="http://schemas.microsoft.com/office/mac/drawingml/2011/main" val="1"/>
             </a:ext>
           </a:extLst>
         </p:spPr>
@@ -2327,14 +2327,14 @@
           <a:effectLst/>
           <a:extLst>
             <a:ext uri="{909E8E84-426E-40dd-AFC4-6F175D3DCCD1}">
-              <a14:hiddenFill xmlns:a14="http://schemas.microsoft.com/office/drawing/2010/main" xmlns="">
+              <a14:hiddenFill xmlns="" xmlns:a14="http://schemas.microsoft.com/office/drawing/2010/main">
                 <a:solidFill>
                   <a:schemeClr val="accent1"/>
                 </a:solidFill>
               </a14:hiddenFill>
             </a:ext>
             <a:ext uri="{91240B29-F687-4f45-9708-019B960494DF}">
-              <a14:hiddenLine xmlns:a14="http://schemas.microsoft.com/office/drawing/2010/main" xmlns="" w="9525">
+              <a14:hiddenLine xmlns="" xmlns:a14="http://schemas.microsoft.com/office/drawing/2010/main" w="9525">
                 <a:solidFill>
                   <a:schemeClr val="tx1"/>
                 </a:solidFill>
@@ -2344,7 +2344,7 @@
               </a14:hiddenLine>
             </a:ext>
             <a:ext uri="{AF507438-7753-43e0-B8FC-AC1667EBCBE1}">
-              <a14:hiddenEffects xmlns:a14="http://schemas.microsoft.com/office/drawing/2010/main" xmlns="">
+              <a14:hiddenEffects xmlns="" xmlns:a14="http://schemas.microsoft.com/office/drawing/2010/main">
                 <a:effectLst>
                   <a:outerShdw blurRad="63500" dist="38099" dir="2700000" algn="ctr" rotWithShape="0">
                     <a:schemeClr val="bg2">
@@ -2355,7 +2355,7 @@
               </a14:hiddenEffects>
             </a:ext>
             <a:ext uri="{FAA26D3D-D897-4be2-8F04-BA451C77F1D7}">
-              <ma14:placeholderFlag xmlns:ma14="http://schemas.microsoft.com/office/mac/drawingml/2011/main" xmlns="" val="1"/>
+              <ma14:placeholderFlag xmlns="" xmlns:ma14="http://schemas.microsoft.com/office/mac/drawingml/2011/main" val="1"/>
             </a:ext>
           </a:extLst>
         </p:spPr>
@@ -9478,54 +9478,6 @@
       </p:cxnSp>
       <p:sp>
         <p:nvSpPr>
-          <p:cNvPr id="22" name="Rectangle 21">
-            <a:extLst>
-              <a:ext uri="{FF2B5EF4-FFF2-40B4-BE49-F238E27FC236}">
-                <a16:creationId xmlns:a16="http://schemas.microsoft.com/office/drawing/2014/main" id="{0EFF09DA-79BA-2D1C-7A8F-F3EB08588A8C}"/>
-              </a:ext>
-            </a:extLst>
-          </p:cNvPr>
-          <p:cNvSpPr/>
-          <p:nvPr/>
-        </p:nvSpPr>
-        <p:spPr>
-          <a:xfrm>
-            <a:off x="4772034" y="3960232"/>
-            <a:ext cx="2071868" cy="851724"/>
-          </a:xfrm>
-          <a:prstGeom prst="rect">
-            <a:avLst/>
-          </a:prstGeom>
-        </p:spPr>
-        <p:style>
-          <a:lnRef idx="2">
-            <a:schemeClr val="accent1">
-              <a:shade val="15000"/>
-            </a:schemeClr>
-          </a:lnRef>
-          <a:fillRef idx="1">
-            <a:schemeClr val="accent1"/>
-          </a:fillRef>
-          <a:effectRef idx="0">
-            <a:schemeClr val="accent1"/>
-          </a:effectRef>
-          <a:fontRef idx="minor">
-            <a:schemeClr val="lt1"/>
-          </a:fontRef>
-        </p:style>
-        <p:txBody>
-          <a:bodyPr rtlCol="0" anchor="ctr"/>
-          <a:lstStyle/>
-          <a:p>
-            <a:r>
-              <a:rPr lang="fr-FR" dirty="0"/>
-              <a:t>Définir et affecter une valeur à des variables</a:t>
-            </a:r>
-          </a:p>
-        </p:txBody>
-      </p:sp>
-      <p:sp>
-        <p:nvSpPr>
           <p:cNvPr id="7" name="Titre 6">
             <a:extLst>
               <a:ext uri="{FF2B5EF4-FFF2-40B4-BE49-F238E27FC236}">
@@ -9580,7 +9532,7 @@
         </p:nvSpPr>
         <p:spPr>
           <a:xfrm>
-            <a:off x="4774242" y="2201529"/>
+            <a:off x="4772034" y="2831066"/>
             <a:ext cx="6661234" cy="1340976"/>
           </a:xfrm>
           <a:prstGeom prst="rect">
@@ -9745,13 +9697,8 @@
             </a:r>
             <a:r>
               <a:rPr lang="fr-FR" dirty="0"/>
-              <a:t> (vrai) et False (faux) et d’autres expressions entre </a:t>
-            </a:r>
-            <a:r>
-              <a:rPr lang="fr-FR" dirty="0" err="1"/>
-              <a:t>booleén</a:t>
-            </a:r>
-            <a:endParaRPr lang="fr-FR" dirty="0"/>
+              <a:t> (vrai) et False (faux) et d’autres expressions entre booléen</a:t>
+            </a:r>
           </a:p>
         </p:txBody>
       </p:sp>
@@ -20984,7 +20931,7 @@
             <a:p>
               <a:r>
                 <a:rPr lang="fr-FR" dirty="0"/>
-                <a:t>Le retour à une indentation précédente mais fin au « if »</a:t>
+                <a:t>Le retour à une indentation précédente met fin au « if »</a:t>
               </a:r>
             </a:p>
           </p:txBody>

</xml_diff>